<commit_message>
add some comments to the report(replacing the word "they")
</commit_message>
<xml_diff>
--- a/SeminarPresentationFinal.pptx
+++ b/SeminarPresentationFinal.pptx
@@ -2470,7 +2470,7 @@
           <a:p>
             <a:fld id="{59041DB8-B66F-4DC8-A96E-33677E0F90FF}" type="datetimeFigureOut">
               <a:rPr lang="en-US" smtClean="0"/>
-              <a:t>12/11/2017</a:t>
+              <a:t>12/12/2017</a:t>
             </a:fld>
             <a:endParaRPr lang="en-US" dirty="0"/>
           </a:p>
@@ -2635,7 +2635,7 @@
           <a:p>
             <a:fld id="{DEB49C4A-65AC-492D-9701-81B46C3AD0E4}" type="datetimeFigureOut">
               <a:rPr lang="en-US" smtClean="0"/>
-              <a:t>12/11/2017</a:t>
+              <a:t>12/12/2017</a:t>
             </a:fld>
             <a:endParaRPr lang="en-US" dirty="0"/>
           </a:p>
@@ -11349,13 +11349,7 @@
                           <a:rPr lang="de-CH" b="0" i="1" smtClean="0">
                             <a:latin typeface="Cambria Math" panose="02040503050406030204" pitchFamily="18" charset="0"/>
                           </a:rPr>
-                          <m:t>1</m:t>
-                        </m:r>
-                        <m:r>
-                          <a:rPr lang="de-CH" b="0" i="1" smtClean="0">
-                            <a:latin typeface="Cambria Math" panose="02040503050406030204" pitchFamily="18" charset="0"/>
-                          </a:rPr>
-                          <m:t>−∝</m:t>
+                          <m:t>1−∝</m:t>
                         </m:r>
                       </m:num>
                       <m:den>
@@ -12411,12 +12405,12 @@
               </a:p>
               <a:p>
                 <a:r>
-                  <a:rPr lang="de-CH" dirty="0"/>
-                  <a:t>C</a:t>
+                  <a:rPr lang="en-GB"/>
+                  <a:t>Combine </a:t>
                 </a:r>
                 <a:r>
                   <a:rPr lang="en-GB" dirty="0"/>
-                  <a:t>combine with static user interests</a:t>
+                  <a:t>with static user interests</a:t>
                 </a:r>
               </a:p>
               <a:p>
@@ -12453,7 +12447,7 @@
                             <m:d>
                               <m:dPr>
                                 <m:ctrlPr>
-                                  <a:rPr lang="de-CH" b="0" i="0" smtClean="0">
+                                  <a:rPr lang="de-CH" b="0" i="1" smtClean="0">
                                     <a:latin typeface="Cambria Math" panose="02040503050406030204" pitchFamily="18" charset="0"/>
                                   </a:rPr>
                                 </m:ctrlPr>
@@ -12539,13 +12533,7 @@
                                   <a:rPr lang="de-CH" b="0" i="1" smtClean="0">
                                     <a:latin typeface="Cambria Math" panose="02040503050406030204" pitchFamily="18" charset="0"/>
                                   </a:rPr>
-                                  <m:t>1</m:t>
-                                </m:r>
-                                <m:r>
-                                  <a:rPr lang="de-CH" b="0" i="1" smtClean="0">
-                                    <a:latin typeface="Cambria Math" panose="02040503050406030204" pitchFamily="18" charset="0"/>
-                                  </a:rPr>
-                                  <m:t>−∝</m:t>
+                                  <m:t>1−∝</m:t>
                                 </m:r>
                               </m:num>
                               <m:den>
@@ -12684,14 +12672,7 @@
                                     <a:latin typeface="Cambria Math" panose="02040503050406030204" pitchFamily="18" charset="0"/>
                                     <a:ea typeface="Cambria Math" panose="02040503050406030204" pitchFamily="18" charset="0"/>
                                   </a:rPr>
-                                  <m:t>1</m:t>
-                                </m:r>
-                                <m:r>
-                                  <a:rPr lang="de-CH" b="0" i="1" smtClean="0">
-                                    <a:latin typeface="Cambria Math" panose="02040503050406030204" pitchFamily="18" charset="0"/>
-                                    <a:ea typeface="Cambria Math" panose="02040503050406030204" pitchFamily="18" charset="0"/>
-                                  </a:rPr>
-                                  <m:t>−∝</m:t>
+                                  <m:t>1−∝</m:t>
                                 </m:r>
                               </m:num>
                               <m:den>

</xml_diff>